<commit_message>
Fix japanese text in an image of Japanese guideline. #2413
(cherry picked from commit b80d5a5ba6df64d973ff56c5aacab6eb61eae8cc)
</commit_message>
<xml_diff>
--- a/source/Security/images_Authorization/materialAuthorization.pptx
+++ b/source/Security/images_Authorization/materialAuthorization.pptx
@@ -210,7 +210,7 @@
             <a:fld id="{3BB47352-BF5A-4CD2-B029-996118CD8E01}" type="datetimeFigureOut">
               <a:rPr kumimoji="1" lang="ja-JP" altLang="en-US" smtClean="0"/>
               <a:pPr/>
-              <a:t>2016/1/14</a:t>
+              <a:t>2017/7/7</a:t>
             </a:fld>
             <a:endParaRPr kumimoji="1" lang="ja-JP" altLang="en-US"/>
           </a:p>
@@ -693,7 +693,7 @@
             <a:fld id="{7B9B12EC-6AA0-374B-A2D3-850081A07A26}" type="datetimeFigureOut">
               <a:rPr kumimoji="1" lang="ja-JP" altLang="en-US" smtClean="0"/>
               <a:pPr/>
-              <a:t>2016/1/14</a:t>
+              <a:t>2017/7/7</a:t>
             </a:fld>
             <a:endParaRPr kumimoji="1" lang="ja-JP" altLang="en-US"/>
           </a:p>
@@ -897,7 +897,7 @@
             <a:fld id="{7B9B12EC-6AA0-374B-A2D3-850081A07A26}" type="datetimeFigureOut">
               <a:rPr kumimoji="1" lang="ja-JP" altLang="en-US" smtClean="0"/>
               <a:pPr/>
-              <a:t>2016/1/14</a:t>
+              <a:t>2017/7/7</a:t>
             </a:fld>
             <a:endParaRPr kumimoji="1" lang="ja-JP" altLang="en-US"/>
           </a:p>
@@ -1111,7 +1111,7 @@
             <a:fld id="{7B9B12EC-6AA0-374B-A2D3-850081A07A26}" type="datetimeFigureOut">
               <a:rPr kumimoji="1" lang="ja-JP" altLang="en-US" smtClean="0"/>
               <a:pPr/>
-              <a:t>2016/1/14</a:t>
+              <a:t>2017/7/7</a:t>
             </a:fld>
             <a:endParaRPr kumimoji="1" lang="ja-JP" altLang="en-US"/>
           </a:p>
@@ -1315,7 +1315,7 @@
             <a:fld id="{7B9B12EC-6AA0-374B-A2D3-850081A07A26}" type="datetimeFigureOut">
               <a:rPr kumimoji="1" lang="ja-JP" altLang="en-US" smtClean="0"/>
               <a:pPr/>
-              <a:t>2016/1/14</a:t>
+              <a:t>2017/7/7</a:t>
             </a:fld>
             <a:endParaRPr kumimoji="1" lang="ja-JP" altLang="en-US"/>
           </a:p>
@@ -1563,7 +1563,7 @@
             <a:fld id="{7B9B12EC-6AA0-374B-A2D3-850081A07A26}" type="datetimeFigureOut">
               <a:rPr kumimoji="1" lang="ja-JP" altLang="en-US" smtClean="0"/>
               <a:pPr/>
-              <a:t>2016/1/14</a:t>
+              <a:t>2017/7/7</a:t>
             </a:fld>
             <a:endParaRPr kumimoji="1" lang="ja-JP" altLang="en-US"/>
           </a:p>
@@ -1917,7 +1917,7 @@
             <a:fld id="{7B9B12EC-6AA0-374B-A2D3-850081A07A26}" type="datetimeFigureOut">
               <a:rPr kumimoji="1" lang="ja-JP" altLang="en-US" smtClean="0"/>
               <a:pPr/>
-              <a:t>2016/1/14</a:t>
+              <a:t>2017/7/7</a:t>
             </a:fld>
             <a:endParaRPr kumimoji="1" lang="ja-JP" altLang="en-US"/>
           </a:p>
@@ -2405,7 +2405,7 @@
             <a:fld id="{7B9B12EC-6AA0-374B-A2D3-850081A07A26}" type="datetimeFigureOut">
               <a:rPr kumimoji="1" lang="ja-JP" altLang="en-US" smtClean="0"/>
               <a:pPr/>
-              <a:t>2016/1/14</a:t>
+              <a:t>2017/7/7</a:t>
             </a:fld>
             <a:endParaRPr kumimoji="1" lang="ja-JP" altLang="en-US"/>
           </a:p>
@@ -2525,7 +2525,7 @@
             <a:fld id="{7B9B12EC-6AA0-374B-A2D3-850081A07A26}" type="datetimeFigureOut">
               <a:rPr kumimoji="1" lang="ja-JP" altLang="en-US" smtClean="0"/>
               <a:pPr/>
-              <a:t>2016/1/14</a:t>
+              <a:t>2017/7/7</a:t>
             </a:fld>
             <a:endParaRPr kumimoji="1" lang="ja-JP" altLang="en-US"/>
           </a:p>
@@ -2622,7 +2622,7 @@
             <a:fld id="{7B9B12EC-6AA0-374B-A2D3-850081A07A26}" type="datetimeFigureOut">
               <a:rPr kumimoji="1" lang="ja-JP" altLang="en-US" smtClean="0"/>
               <a:pPr/>
-              <a:t>2016/1/14</a:t>
+              <a:t>2017/7/7</a:t>
             </a:fld>
             <a:endParaRPr kumimoji="1" lang="ja-JP" altLang="en-US"/>
           </a:p>
@@ -2933,7 +2933,7 @@
             <a:fld id="{7B9B12EC-6AA0-374B-A2D3-850081A07A26}" type="datetimeFigureOut">
               <a:rPr kumimoji="1" lang="ja-JP" altLang="en-US" smtClean="0"/>
               <a:pPr/>
-              <a:t>2016/1/14</a:t>
+              <a:t>2017/7/7</a:t>
             </a:fld>
             <a:endParaRPr kumimoji="1" lang="ja-JP" altLang="en-US"/>
           </a:p>
@@ -3188,7 +3188,7 @@
             <a:fld id="{7B9B12EC-6AA0-374B-A2D3-850081A07A26}" type="datetimeFigureOut">
               <a:rPr kumimoji="1" lang="ja-JP" altLang="en-US" smtClean="0"/>
               <a:pPr/>
-              <a:t>2016/1/14</a:t>
+              <a:t>2017/7/7</a:t>
             </a:fld>
             <a:endParaRPr kumimoji="1" lang="ja-JP" altLang="en-US"/>
           </a:p>
@@ -3435,7 +3435,7 @@
             <a:fld id="{7B9B12EC-6AA0-374B-A2D3-850081A07A26}" type="datetimeFigureOut">
               <a:rPr kumimoji="1" lang="ja-JP" altLang="en-US" smtClean="0"/>
               <a:pPr/>
-              <a:t>2016/1/14</a:t>
+              <a:t>2017/7/7</a:t>
             </a:fld>
             <a:endParaRPr kumimoji="1" lang="ja-JP" altLang="en-US"/>
           </a:p>
@@ -5326,7 +5326,7 @@
           <a:p>
             <a:pPr algn="ctr"/>
             <a:r>
-              <a:rPr lang="ja-JP" altLang="en-US" dirty="0" smtClean="0">
+              <a:rPr lang="en-US" altLang="ja-JP" dirty="0">
                 <a:solidFill>
                   <a:schemeClr val="tx1">
                     <a:lumMod val="75000"/>
@@ -5336,7 +5336,7 @@
                 <a:latin typeface="HGP創英角ｺﾞｼｯｸUB" panose="020B0900000000000000" pitchFamily="50" charset="-128"/>
                 <a:ea typeface="HGP創英角ｺﾞｼｯｸUB" panose="020B0900000000000000" pitchFamily="50" charset="-128"/>
               </a:rPr>
-              <a:t>リソースのアクセスポリシーの連携</a:t>
+              <a:t>Linking with access policy of resource</a:t>
             </a:r>
             <a:endParaRPr lang="en-US" altLang="ja-JP" dirty="0" smtClean="0">
               <a:solidFill>
@@ -5499,14 +5499,6 @@
               </a:rPr>
               <a:t>Resource</a:t>
             </a:r>
-            <a:endParaRPr kumimoji="1" lang="en-US" altLang="ja-JP" sz="2000" dirty="0" smtClean="0">
-              <a:solidFill>
-                <a:schemeClr val="tx1">
-                  <a:lumMod val="50000"/>
-                  <a:lumOff val="50000"/>
-                </a:schemeClr>
-              </a:solidFill>
-            </a:endParaRPr>
           </a:p>
         </p:txBody>
       </p:sp>

</xml_diff>